<commit_message>
updated lecture 12 Thu 10-3-19
</commit_message>
<xml_diff>
--- a/Lecture/CSE 4361 Lecture 12 Thu 10-3-19.pptx
+++ b/Lecture/CSE 4361 Lecture 12 Thu 10-3-19.pptx
@@ -12,6 +12,12 @@
     <p:sldId id="260" r:id="rId6"/>
     <p:sldId id="261" r:id="rId7"/>
     <p:sldId id="262" r:id="rId8"/>
+    <p:sldId id="263" r:id="rId9"/>
+    <p:sldId id="264" r:id="rId10"/>
+    <p:sldId id="265" r:id="rId11"/>
+    <p:sldId id="266" r:id="rId12"/>
+    <p:sldId id="267" r:id="rId13"/>
+    <p:sldId id="268" r:id="rId14"/>
   </p:sldIdLst>
   <p:sldSz cx="9144000" cy="6858000" type="screen4x3"/>
   <p:notesSz cx="6858000" cy="9144000"/>
@@ -110,6 +116,11 @@
       </a:defRPr>
     </a:lvl9pPr>
   </p:defaultTextStyle>
+  <p:extLst>
+    <p:ext uri="{EFAFB233-063F-42B5-8137-9DF3F51BA10A}">
+      <p15:sldGuideLst xmlns:p15="http://schemas.microsoft.com/office/powerpoint/2012/main"/>
+    </p:ext>
+  </p:extLst>
 </p:presentation>
 </file>
 
@@ -3047,6 +3058,979 @@
 </p:sld>
 </file>
 
+<file path=ppt/slides/slide10.xml><?xml version="1.0" encoding="utf-8"?>
+<p:sld xmlns:a="http://schemas.openxmlformats.org/drawingml/2006/main" xmlns:r="http://schemas.openxmlformats.org/officeDocument/2006/relationships" xmlns:p="http://schemas.openxmlformats.org/presentationml/2006/main">
+  <p:cSld>
+    <p:spTree>
+      <p:nvGrpSpPr>
+        <p:cNvPr id="1" name=""/>
+        <p:cNvGrpSpPr/>
+        <p:nvPr/>
+      </p:nvGrpSpPr>
+      <p:grpSpPr>
+        <a:xfrm>
+          <a:off x="0" y="0"/>
+          <a:ext cx="0" cy="0"/>
+          <a:chOff x="0" y="0"/>
+          <a:chExt cx="0" cy="0"/>
+        </a:xfrm>
+      </p:grpSpPr>
+      <p:sp>
+        <p:nvSpPr>
+          <p:cNvPr id="2" name="Title 1">
+            <a:extLst>
+              <a:ext uri="{FF2B5EF4-FFF2-40B4-BE49-F238E27FC236}">
+                <a16:creationId xmlns:a16="http://schemas.microsoft.com/office/drawing/2014/main" id="{96C782EB-210A-4809-951D-14D5B20367C6}"/>
+              </a:ext>
+            </a:extLst>
+          </p:cNvPr>
+          <p:cNvSpPr>
+            <a:spLocks noGrp="1"/>
+          </p:cNvSpPr>
+          <p:nvPr>
+            <p:ph type="title"/>
+          </p:nvPr>
+        </p:nvSpPr>
+        <p:spPr/>
+        <p:txBody>
+          <a:bodyPr/>
+          <a:lstStyle/>
+          <a:p>
+            <a:r>
+              <a:rPr lang="en-US" dirty="0"/>
+              <a:t>Bridge Pattern Sample Code</a:t>
+            </a:r>
+          </a:p>
+        </p:txBody>
+      </p:sp>
+      <p:sp>
+        <p:nvSpPr>
+          <p:cNvPr id="3" name="Content Placeholder 2">
+            <a:extLst>
+              <a:ext uri="{FF2B5EF4-FFF2-40B4-BE49-F238E27FC236}">
+                <a16:creationId xmlns:a16="http://schemas.microsoft.com/office/drawing/2014/main" id="{447629E9-ACFB-4A3F-ACC7-61E7AF3DE56F}"/>
+              </a:ext>
+            </a:extLst>
+          </p:cNvPr>
+          <p:cNvSpPr>
+            <a:spLocks noGrp="1"/>
+          </p:cNvSpPr>
+          <p:nvPr>
+            <p:ph idx="1"/>
+          </p:nvPr>
+        </p:nvSpPr>
+        <p:spPr>
+          <a:xfrm>
+            <a:off x="4657458" y="1825625"/>
+            <a:ext cx="3857891" cy="4351338"/>
+          </a:xfrm>
+        </p:spPr>
+        <p:txBody>
+          <a:bodyPr>
+            <a:normAutofit/>
+          </a:bodyPr>
+          <a:lstStyle/>
+          <a:p>
+            <a:pPr marL="230188" indent="-230188">
+              <a:spcBef>
+                <a:spcPts val="20"/>
+              </a:spcBef>
+              <a:buNone/>
+            </a:pPr>
+            <a:r>
+              <a:rPr lang="en-US" sz="1600" dirty="0"/>
+              <a:t>public class </a:t>
+            </a:r>
+            <a:r>
+              <a:rPr lang="en-US" sz="1600" dirty="0" err="1"/>
+              <a:t>DBMgr</a:t>
+            </a:r>
+            <a:endParaRPr lang="en-US" sz="1600" dirty="0"/>
+          </a:p>
+          <a:p>
+            <a:pPr marL="230188" indent="-230188">
+              <a:spcBef>
+                <a:spcPts val="20"/>
+              </a:spcBef>
+              <a:buNone/>
+            </a:pPr>
+            <a:r>
+              <a:rPr lang="en-US" sz="1600" dirty="0"/>
+              <a:t>{</a:t>
+            </a:r>
+          </a:p>
+          <a:p>
+            <a:pPr marL="684213" indent="-230188">
+              <a:spcBef>
+                <a:spcPts val="20"/>
+              </a:spcBef>
+              <a:buNone/>
+            </a:pPr>
+            <a:r>
+              <a:rPr lang="en-US" sz="1600" dirty="0" err="1"/>
+              <a:t>DBAccessImpl</a:t>
+            </a:r>
+            <a:r>
+              <a:rPr lang="en-US" sz="1600" dirty="0"/>
+              <a:t> imp;</a:t>
+            </a:r>
+          </a:p>
+          <a:p>
+            <a:pPr marL="684213" indent="-230188">
+              <a:spcBef>
+                <a:spcPts val="20"/>
+              </a:spcBef>
+              <a:buNone/>
+            </a:pPr>
+            <a:r>
+              <a:rPr lang="en-US" sz="1600" dirty="0"/>
+              <a:t>public </a:t>
+            </a:r>
+            <a:r>
+              <a:rPr lang="en-US" sz="1600" dirty="0" err="1"/>
+              <a:t>DBMgr</a:t>
+            </a:r>
+            <a:r>
+              <a:rPr lang="en-US" sz="1600" dirty="0"/>
+              <a:t>() {</a:t>
+            </a:r>
+          </a:p>
+          <a:p>
+            <a:pPr marL="914400" indent="-230188">
+              <a:spcBef>
+                <a:spcPts val="20"/>
+              </a:spcBef>
+              <a:buNone/>
+            </a:pPr>
+            <a:r>
+              <a:rPr lang="en-US" sz="1600" dirty="0"/>
+              <a:t>…</a:t>
+            </a:r>
+          </a:p>
+          <a:p>
+            <a:pPr marL="914400" indent="-230188">
+              <a:spcBef>
+                <a:spcPts val="20"/>
+              </a:spcBef>
+              <a:buNone/>
+            </a:pPr>
+            <a:r>
+              <a:rPr lang="en-US" sz="1600" dirty="0"/>
+              <a:t>imp=</a:t>
+            </a:r>
+            <a:r>
+              <a:rPr lang="en-US" sz="1600" dirty="0" err="1"/>
+              <a:t>Config.getInstance</a:t>
+            </a:r>
+            <a:r>
+              <a:rPr lang="en-US" sz="1600" dirty="0"/>
+              <a:t>().</a:t>
+            </a:r>
+          </a:p>
+          <a:p>
+            <a:pPr marL="1144588" indent="-230188">
+              <a:spcBef>
+                <a:spcPts val="20"/>
+              </a:spcBef>
+              <a:buNone/>
+            </a:pPr>
+            <a:r>
+              <a:rPr lang="en-US" sz="1600" dirty="0" err="1"/>
+              <a:t>getDB</a:t>
+            </a:r>
+            <a:r>
+              <a:rPr lang="en-US" sz="1600" dirty="0"/>
+              <a:t>();</a:t>
+            </a:r>
+          </a:p>
+          <a:p>
+            <a:pPr marL="684213" indent="-230188">
+              <a:spcBef>
+                <a:spcPts val="20"/>
+              </a:spcBef>
+              <a:buNone/>
+            </a:pPr>
+            <a:r>
+              <a:rPr lang="en-US" sz="1600" dirty="0"/>
+              <a:t>}</a:t>
+            </a:r>
+          </a:p>
+          <a:p>
+            <a:pPr marL="684213" indent="-230188">
+              <a:spcBef>
+                <a:spcPts val="20"/>
+              </a:spcBef>
+              <a:buNone/>
+            </a:pPr>
+            <a:r>
+              <a:rPr lang="en-US" sz="1600" dirty="0"/>
+              <a:t>public User get User (String </a:t>
+            </a:r>
+            <a:r>
+              <a:rPr lang="en-US" sz="1600" dirty="0" err="1"/>
+              <a:t>uid</a:t>
+            </a:r>
+            <a:r>
+              <a:rPr lang="en-US" sz="1600" dirty="0"/>
+              <a:t>)</a:t>
+            </a:r>
+          </a:p>
+          <a:p>
+            <a:pPr marL="684213" indent="-230188">
+              <a:spcBef>
+                <a:spcPts val="20"/>
+              </a:spcBef>
+              <a:buNone/>
+            </a:pPr>
+            <a:r>
+              <a:rPr lang="en-US" sz="1600" dirty="0"/>
+              <a:t>{ </a:t>
+            </a:r>
+            <a:r>
+              <a:rPr lang="en-US" sz="1600" dirty="0" err="1"/>
+              <a:t>retrun</a:t>
+            </a:r>
+            <a:r>
+              <a:rPr lang="en-US" sz="1600" dirty="0"/>
+              <a:t> </a:t>
+            </a:r>
+            <a:r>
+              <a:rPr lang="en-US" sz="1600" dirty="0" err="1"/>
+              <a:t>imp.getUser</a:t>
+            </a:r>
+            <a:r>
+              <a:rPr lang="en-US" sz="1600" dirty="0"/>
+              <a:t> (</a:t>
+            </a:r>
+            <a:r>
+              <a:rPr lang="en-US" sz="1600" dirty="0" err="1"/>
+              <a:t>uid</a:t>
+            </a:r>
+            <a:r>
+              <a:rPr lang="en-US" sz="1600" dirty="0"/>
+              <a:t>); }</a:t>
+            </a:r>
+          </a:p>
+          <a:p>
+            <a:pPr marL="684213" indent="-230188">
+              <a:spcBef>
+                <a:spcPts val="20"/>
+              </a:spcBef>
+              <a:buNone/>
+            </a:pPr>
+            <a:r>
+              <a:rPr lang="en-US" sz="1600" dirty="0"/>
+              <a:t>public Book </a:t>
+            </a:r>
+            <a:r>
+              <a:rPr lang="en-US" sz="1600" dirty="0" err="1"/>
+              <a:t>getBook</a:t>
+            </a:r>
+            <a:r>
+              <a:rPr lang="en-US" sz="1600" dirty="0"/>
+              <a:t> (String  </a:t>
+            </a:r>
+            <a:r>
+              <a:rPr lang="en-US" sz="1600" dirty="0" err="1"/>
+              <a:t>callNo</a:t>
+            </a:r>
+            <a:r>
+              <a:rPr lang="en-US" sz="1600" dirty="0"/>
+              <a:t>); }</a:t>
+            </a:r>
+          </a:p>
+          <a:p>
+            <a:pPr marL="684213" indent="-230188">
+              <a:spcBef>
+                <a:spcPts val="20"/>
+              </a:spcBef>
+              <a:buNone/>
+            </a:pPr>
+            <a:r>
+              <a:rPr lang="en-US" sz="1600" dirty="0"/>
+              <a:t>public void </a:t>
+            </a:r>
+            <a:r>
+              <a:rPr lang="en-US" sz="1600" dirty="0" err="1"/>
+              <a:t>saveLoan</a:t>
+            </a:r>
+            <a:r>
+              <a:rPr lang="en-US" sz="1600" dirty="0"/>
+              <a:t> (Loan loan)</a:t>
+            </a:r>
+          </a:p>
+          <a:p>
+            <a:pPr marL="684213" indent="-230188">
+              <a:spcBef>
+                <a:spcPts val="20"/>
+              </a:spcBef>
+              <a:buNone/>
+            </a:pPr>
+            <a:r>
+              <a:rPr lang="en-US" sz="1600" dirty="0"/>
+              <a:t>{ </a:t>
+            </a:r>
+            <a:r>
+              <a:rPr lang="en-US" sz="1600" dirty="0" err="1"/>
+              <a:t>imp.saveLoan</a:t>
+            </a:r>
+            <a:r>
+              <a:rPr lang="en-US" sz="1600" dirty="0"/>
+              <a:t> (loan); }</a:t>
+            </a:r>
+          </a:p>
+          <a:p>
+            <a:pPr marL="684213" indent="-230188">
+              <a:spcBef>
+                <a:spcPts val="20"/>
+              </a:spcBef>
+              <a:buNone/>
+            </a:pPr>
+            <a:r>
+              <a:rPr lang="en-US" sz="1600" dirty="0"/>
+              <a:t>public void </a:t>
+            </a:r>
+            <a:r>
+              <a:rPr lang="en-US" sz="1600" dirty="0" err="1"/>
+              <a:t>saveBook</a:t>
+            </a:r>
+            <a:r>
+              <a:rPr lang="en-US" sz="1600" dirty="0"/>
+              <a:t> (Book book)</a:t>
+            </a:r>
+          </a:p>
+          <a:p>
+            <a:pPr marL="684213" indent="-230188">
+              <a:spcBef>
+                <a:spcPts val="20"/>
+              </a:spcBef>
+              <a:buNone/>
+            </a:pPr>
+            <a:r>
+              <a:rPr lang="en-US" sz="1600" dirty="0"/>
+              <a:t>{ </a:t>
+            </a:r>
+            <a:r>
+              <a:rPr lang="en-US" sz="1600" dirty="0" err="1"/>
+              <a:t>imp.saveBook</a:t>
+            </a:r>
+            <a:r>
+              <a:rPr lang="en-US" sz="1600" dirty="0"/>
+              <a:t> (book); }</a:t>
+            </a:r>
+          </a:p>
+          <a:p>
+            <a:pPr marL="230188" indent="-230188">
+              <a:spcBef>
+                <a:spcPts val="20"/>
+              </a:spcBef>
+              <a:buNone/>
+            </a:pPr>
+            <a:r>
+              <a:rPr lang="en-US" sz="1600" dirty="0"/>
+              <a:t>}</a:t>
+            </a:r>
+          </a:p>
+        </p:txBody>
+      </p:sp>
+    </p:spTree>
+    <p:extLst>
+      <p:ext uri="{BB962C8B-B14F-4D97-AF65-F5344CB8AC3E}">
+        <p14:creationId xmlns:p14="http://schemas.microsoft.com/office/powerpoint/2010/main" val="1378277191"/>
+      </p:ext>
+    </p:extLst>
+  </p:cSld>
+  <p:clrMapOvr>
+    <a:masterClrMapping/>
+  </p:clrMapOvr>
+</p:sld>
+</file>
+
+<file path=ppt/slides/slide11.xml><?xml version="1.0" encoding="utf-8"?>
+<p:sld xmlns:a="http://schemas.openxmlformats.org/drawingml/2006/main" xmlns:r="http://schemas.openxmlformats.org/officeDocument/2006/relationships" xmlns:p="http://schemas.openxmlformats.org/presentationml/2006/main">
+  <p:cSld>
+    <p:spTree>
+      <p:nvGrpSpPr>
+        <p:cNvPr id="1" name=""/>
+        <p:cNvGrpSpPr/>
+        <p:nvPr/>
+      </p:nvGrpSpPr>
+      <p:grpSpPr>
+        <a:xfrm>
+          <a:off x="0" y="0"/>
+          <a:ext cx="0" cy="0"/>
+          <a:chOff x="0" y="0"/>
+          <a:chExt cx="0" cy="0"/>
+        </a:xfrm>
+      </p:grpSpPr>
+      <p:sp>
+        <p:nvSpPr>
+          <p:cNvPr id="2" name="Title 1">
+            <a:extLst>
+              <a:ext uri="{FF2B5EF4-FFF2-40B4-BE49-F238E27FC236}">
+                <a16:creationId xmlns:a16="http://schemas.microsoft.com/office/drawing/2014/main" id="{98F20C98-2885-4D9F-89D5-856AB5FA982A}"/>
+              </a:ext>
+            </a:extLst>
+          </p:cNvPr>
+          <p:cNvSpPr>
+            <a:spLocks noGrp="1"/>
+          </p:cNvSpPr>
+          <p:nvPr>
+            <p:ph type="title"/>
+          </p:nvPr>
+        </p:nvSpPr>
+        <p:spPr/>
+        <p:txBody>
+          <a:bodyPr/>
+          <a:lstStyle/>
+          <a:p>
+            <a:r>
+              <a:rPr lang="en-US" dirty="0"/>
+              <a:t>Bridge Pattern Sample Code</a:t>
+            </a:r>
+          </a:p>
+        </p:txBody>
+      </p:sp>
+      <p:sp>
+        <p:nvSpPr>
+          <p:cNvPr id="3" name="Content Placeholder 2">
+            <a:extLst>
+              <a:ext uri="{FF2B5EF4-FFF2-40B4-BE49-F238E27FC236}">
+                <a16:creationId xmlns:a16="http://schemas.microsoft.com/office/drawing/2014/main" id="{CFF72DFD-08D1-49B8-9526-6C069F921950}"/>
+              </a:ext>
+            </a:extLst>
+          </p:cNvPr>
+          <p:cNvSpPr>
+            <a:spLocks noGrp="1"/>
+          </p:cNvSpPr>
+          <p:nvPr>
+            <p:ph idx="1"/>
+          </p:nvPr>
+        </p:nvSpPr>
+        <p:spPr>
+          <a:xfrm>
+            <a:off x="4666004" y="1825625"/>
+            <a:ext cx="3849346" cy="4351338"/>
+          </a:xfrm>
+        </p:spPr>
+        <p:txBody>
+          <a:bodyPr>
+            <a:normAutofit/>
+          </a:bodyPr>
+          <a:lstStyle/>
+          <a:p>
+            <a:pPr marL="230188" indent="-230188">
+              <a:spcBef>
+                <a:spcPts val="20"/>
+              </a:spcBef>
+              <a:buNone/>
+            </a:pPr>
+            <a:r>
+              <a:rPr lang="en-US" sz="1600" dirty="0"/>
+              <a:t>public class </a:t>
+            </a:r>
+            <a:r>
+              <a:rPr lang="en-US" sz="1600" dirty="0" err="1"/>
+              <a:t>CheckoutController</a:t>
+            </a:r>
+            <a:r>
+              <a:rPr lang="en-US" sz="1600" dirty="0"/>
+              <a:t> {</a:t>
+            </a:r>
+          </a:p>
+          <a:p>
+            <a:pPr marL="230188" indent="-119063">
+              <a:spcBef>
+                <a:spcPts val="20"/>
+              </a:spcBef>
+              <a:buNone/>
+            </a:pPr>
+            <a:r>
+              <a:rPr lang="en-US" sz="1600" dirty="0" err="1"/>
+              <a:t>DBmgr</a:t>
+            </a:r>
+            <a:r>
+              <a:rPr lang="en-US" sz="1600" dirty="0"/>
+              <a:t> </a:t>
+            </a:r>
+            <a:r>
+              <a:rPr lang="en-US" sz="1600" dirty="0" err="1"/>
+              <a:t>dbm</a:t>
+            </a:r>
+            <a:r>
+              <a:rPr lang="en-US" sz="1600" dirty="0"/>
+              <a:t>=new </a:t>
+            </a:r>
+            <a:r>
+              <a:rPr lang="en-US" sz="1600" dirty="0" err="1"/>
+              <a:t>DBMgr</a:t>
+            </a:r>
+            <a:r>
+              <a:rPr lang="en-US" sz="1600" dirty="0"/>
+              <a:t>();</a:t>
+            </a:r>
+          </a:p>
+          <a:p>
+            <a:pPr marL="111125" indent="120650">
+              <a:spcBef>
+                <a:spcPts val="20"/>
+              </a:spcBef>
+              <a:buNone/>
+            </a:pPr>
+            <a:r>
+              <a:rPr lang="en-US" sz="1600" dirty="0"/>
+              <a:t>…</a:t>
+            </a:r>
+          </a:p>
+          <a:p>
+            <a:pPr marL="111125" indent="120650">
+              <a:spcBef>
+                <a:spcPts val="20"/>
+              </a:spcBef>
+              <a:buNone/>
+            </a:pPr>
+            <a:r>
+              <a:rPr lang="en-US" sz="1600" dirty="0"/>
+              <a:t>public String checkout (String </a:t>
+            </a:r>
+            <a:r>
+              <a:rPr lang="en-US" sz="1600" dirty="0" err="1"/>
+              <a:t>uid</a:t>
+            </a:r>
+            <a:r>
+              <a:rPr lang="en-US" sz="1600" dirty="0"/>
+              <a:t>, </a:t>
+            </a:r>
+            <a:r>
+              <a:rPr lang="en-US" sz="1600" dirty="0" err="1"/>
+              <a:t>Stgring</a:t>
+            </a:r>
+            <a:r>
+              <a:rPr lang="en-US" sz="1600" dirty="0"/>
+              <a:t> </a:t>
+            </a:r>
+            <a:r>
+              <a:rPr lang="en-US" sz="1600" dirty="0" err="1"/>
+              <a:t>cn</a:t>
+            </a:r>
+            <a:r>
+              <a:rPr lang="en-US" sz="1600" dirty="0"/>
+              <a:t>) {</a:t>
+            </a:r>
+          </a:p>
+          <a:p>
+            <a:pPr marL="461963" indent="-109538">
+              <a:spcBef>
+                <a:spcPts val="20"/>
+              </a:spcBef>
+              <a:buNone/>
+            </a:pPr>
+            <a:r>
+              <a:rPr lang="en-US" sz="1600" dirty="0"/>
+              <a:t>User u=</a:t>
+            </a:r>
+            <a:r>
+              <a:rPr lang="en-US" sz="1600" dirty="0" err="1"/>
+              <a:t>dbm.getUser</a:t>
+            </a:r>
+            <a:r>
+              <a:rPr lang="en-US" sz="1600" dirty="0"/>
+              <a:t>();</a:t>
+            </a:r>
+          </a:p>
+          <a:p>
+            <a:pPr marL="461963" indent="-109538">
+              <a:spcBef>
+                <a:spcPts val="20"/>
+              </a:spcBef>
+              <a:buNone/>
+            </a:pPr>
+            <a:r>
+              <a:rPr lang="en-US" sz="1600" dirty="0"/>
+              <a:t>if (u!=null) return process(</a:t>
+            </a:r>
+            <a:r>
+              <a:rPr lang="en-US" sz="1600" dirty="0" err="1"/>
+              <a:t>cn</a:t>
+            </a:r>
+            <a:r>
+              <a:rPr lang="en-US" sz="1600" dirty="0"/>
+              <a:t>, u);</a:t>
+            </a:r>
+          </a:p>
+          <a:p>
+            <a:pPr marL="341313" indent="-109538">
+              <a:spcBef>
+                <a:spcPts val="20"/>
+              </a:spcBef>
+              <a:buNone/>
+            </a:pPr>
+            <a:r>
+              <a:rPr lang="en-US" sz="1600" dirty="0"/>
+              <a:t>}</a:t>
+            </a:r>
+          </a:p>
+          <a:p>
+            <a:pPr marL="341313" indent="-109538">
+              <a:spcBef>
+                <a:spcPts val="20"/>
+              </a:spcBef>
+              <a:buNone/>
+            </a:pPr>
+            <a:r>
+              <a:rPr lang="en-US" sz="1600" dirty="0"/>
+              <a:t>public String process (String </a:t>
+            </a:r>
+            <a:r>
+              <a:rPr lang="en-US" sz="1600" dirty="0" err="1"/>
+              <a:t>cn</a:t>
+            </a:r>
+            <a:r>
+              <a:rPr lang="en-US" sz="1600" dirty="0"/>
+              <a:t>, User u)</a:t>
+            </a:r>
+          </a:p>
+          <a:p>
+            <a:pPr marL="341313" indent="-109538">
+              <a:spcBef>
+                <a:spcPts val="20"/>
+              </a:spcBef>
+              <a:buNone/>
+            </a:pPr>
+            <a:r>
+              <a:rPr lang="en-US" sz="1600" dirty="0"/>
+              <a:t>{</a:t>
+            </a:r>
+          </a:p>
+          <a:p>
+            <a:pPr marL="461963" indent="-109538">
+              <a:spcBef>
+                <a:spcPts val="20"/>
+              </a:spcBef>
+              <a:buNone/>
+            </a:pPr>
+            <a:r>
+              <a:rPr lang="en-US" sz="1600" dirty="0"/>
+              <a:t>Document d=</a:t>
+            </a:r>
+            <a:r>
+              <a:rPr lang="en-US" sz="1600" dirty="0" err="1"/>
+              <a:t>dbm.getBook</a:t>
+            </a:r>
+            <a:r>
+              <a:rPr lang="en-US" sz="1600" dirty="0"/>
+              <a:t>(</a:t>
+            </a:r>
+            <a:r>
+              <a:rPr lang="en-US" sz="1600" dirty="0" err="1"/>
+              <a:t>cn</a:t>
+            </a:r>
+            <a:r>
+              <a:rPr lang="en-US" sz="1600" dirty="0"/>
+              <a:t>);</a:t>
+            </a:r>
+          </a:p>
+          <a:p>
+            <a:pPr marL="461963" indent="-109538">
+              <a:spcBef>
+                <a:spcPts val="20"/>
+              </a:spcBef>
+              <a:buNone/>
+            </a:pPr>
+            <a:r>
+              <a:rPr lang="en-US" sz="1600" dirty="0"/>
+              <a:t>if(</a:t>
+            </a:r>
+            <a:r>
+              <a:rPr lang="en-US" sz="1600" dirty="0" err="1"/>
+              <a:t>d.isAvailable</a:t>
+            </a:r>
+            <a:r>
+              <a:rPr lang="en-US" sz="1600" dirty="0"/>
+              <a:t>()) {</a:t>
+            </a:r>
+          </a:p>
+          <a:p>
+            <a:pPr marL="573088" indent="-109538">
+              <a:spcBef>
+                <a:spcPts val="20"/>
+              </a:spcBef>
+              <a:buNone/>
+            </a:pPr>
+            <a:r>
+              <a:rPr lang="en-US" sz="1600" dirty="0"/>
+              <a:t>Loan l=new Loan (u, d);</a:t>
+            </a:r>
+          </a:p>
+          <a:p>
+            <a:pPr marL="573088" indent="-109538">
+              <a:spcBef>
+                <a:spcPts val="20"/>
+              </a:spcBef>
+              <a:buNone/>
+            </a:pPr>
+            <a:r>
+              <a:rPr lang="en-US" sz="1600" dirty="0" err="1"/>
+              <a:t>dbm.saveLoan</a:t>
+            </a:r>
+            <a:r>
+              <a:rPr lang="en-US" sz="1600" dirty="0"/>
+              <a:t>(l);</a:t>
+            </a:r>
+          </a:p>
+          <a:p>
+            <a:pPr marL="573088" indent="-109538">
+              <a:spcBef>
+                <a:spcPts val="20"/>
+              </a:spcBef>
+              <a:buNone/>
+            </a:pPr>
+            <a:r>
+              <a:rPr lang="en-US" sz="1600" dirty="0" err="1"/>
+              <a:t>d.setAvailable</a:t>
+            </a:r>
+            <a:r>
+              <a:rPr lang="en-US" sz="1600" dirty="0"/>
+              <a:t>(false);</a:t>
+            </a:r>
+          </a:p>
+          <a:p>
+            <a:pPr marL="573088" indent="-109538">
+              <a:spcBef>
+                <a:spcPts val="20"/>
+              </a:spcBef>
+              <a:buNone/>
+            </a:pPr>
+            <a:r>
+              <a:rPr lang="en-US" sz="1600" dirty="0" err="1"/>
+              <a:t>dbm.saveBook</a:t>
+            </a:r>
+            <a:r>
+              <a:rPr lang="en-US" sz="1600" dirty="0"/>
+              <a:t>(d);</a:t>
+            </a:r>
+          </a:p>
+          <a:p>
+            <a:pPr marL="341313" indent="-109538">
+              <a:spcBef>
+                <a:spcPts val="20"/>
+              </a:spcBef>
+              <a:buNone/>
+            </a:pPr>
+            <a:r>
+              <a:rPr lang="en-US" sz="1600" dirty="0"/>
+              <a:t>}</a:t>
+            </a:r>
+          </a:p>
+          <a:p>
+            <a:pPr marL="341313" indent="-109538">
+              <a:spcBef>
+                <a:spcPts val="20"/>
+              </a:spcBef>
+              <a:buNone/>
+            </a:pPr>
+            <a:r>
+              <a:rPr lang="en-US" sz="1600" dirty="0"/>
+              <a:t>…</a:t>
+            </a:r>
+          </a:p>
+          <a:p>
+            <a:pPr marL="230188" indent="-109538">
+              <a:spcBef>
+                <a:spcPts val="20"/>
+              </a:spcBef>
+              <a:buNone/>
+            </a:pPr>
+            <a:r>
+              <a:rPr lang="en-US" sz="1600" dirty="0"/>
+              <a:t>}</a:t>
+            </a:r>
+          </a:p>
+        </p:txBody>
+      </p:sp>
+    </p:spTree>
+    <p:extLst>
+      <p:ext uri="{BB962C8B-B14F-4D97-AF65-F5344CB8AC3E}">
+        <p14:creationId xmlns:p14="http://schemas.microsoft.com/office/powerpoint/2010/main" val="3921750593"/>
+      </p:ext>
+    </p:extLst>
+  </p:cSld>
+  <p:clrMapOvr>
+    <a:masterClrMapping/>
+  </p:clrMapOvr>
+</p:sld>
+</file>
+
+<file path=ppt/slides/slide12.xml><?xml version="1.0" encoding="utf-8"?>
+<p:sld xmlns:a="http://schemas.openxmlformats.org/drawingml/2006/main" xmlns:r="http://schemas.openxmlformats.org/officeDocument/2006/relationships" xmlns:p="http://schemas.openxmlformats.org/presentationml/2006/main">
+  <p:cSld>
+    <p:spTree>
+      <p:nvGrpSpPr>
+        <p:cNvPr id="1" name=""/>
+        <p:cNvGrpSpPr/>
+        <p:nvPr/>
+      </p:nvGrpSpPr>
+      <p:grpSpPr>
+        <a:xfrm>
+          <a:off x="0" y="0"/>
+          <a:ext cx="0" cy="0"/>
+          <a:chOff x="0" y="0"/>
+          <a:chExt cx="0" cy="0"/>
+        </a:xfrm>
+      </p:grpSpPr>
+      <p:sp>
+        <p:nvSpPr>
+          <p:cNvPr id="2" name="Title 1">
+            <a:extLst>
+              <a:ext uri="{FF2B5EF4-FFF2-40B4-BE49-F238E27FC236}">
+                <a16:creationId xmlns:a16="http://schemas.microsoft.com/office/drawing/2014/main" id="{7B08F2E9-B234-4798-B686-4C1CA0752E31}"/>
+              </a:ext>
+            </a:extLst>
+          </p:cNvPr>
+          <p:cNvSpPr>
+            <a:spLocks noGrp="1"/>
+          </p:cNvSpPr>
+          <p:nvPr>
+            <p:ph type="title"/>
+          </p:nvPr>
+        </p:nvSpPr>
+        <p:spPr/>
+        <p:txBody>
+          <a:bodyPr/>
+          <a:lstStyle/>
+          <a:p>
+            <a:r>
+              <a:rPr lang="en-US" dirty="0"/>
+              <a:t>The Bridge Pattern</a:t>
+            </a:r>
+          </a:p>
+        </p:txBody>
+      </p:sp>
+      <p:sp>
+        <p:nvSpPr>
+          <p:cNvPr id="3" name="Content Placeholder 2">
+            <a:extLst>
+              <a:ext uri="{FF2B5EF4-FFF2-40B4-BE49-F238E27FC236}">
+                <a16:creationId xmlns:a16="http://schemas.microsoft.com/office/drawing/2014/main" id="{75C84C01-0AC4-47EB-ABC7-7BAD21D12BB9}"/>
+              </a:ext>
+            </a:extLst>
+          </p:cNvPr>
+          <p:cNvSpPr>
+            <a:spLocks noGrp="1"/>
+          </p:cNvSpPr>
+          <p:nvPr>
+            <p:ph idx="1"/>
+          </p:nvPr>
+        </p:nvSpPr>
+        <p:spPr/>
+        <p:txBody>
+          <a:bodyPr/>
+          <a:lstStyle/>
+          <a:p>
+            <a:r>
+              <a:rPr lang="en-US" dirty="0"/>
+              <a:t>Decouples the client interface from tis implementation.</a:t>
+            </a:r>
+          </a:p>
+          <a:p>
+            <a:r>
+              <a:rPr lang="en-US" dirty="0"/>
+              <a:t>Lets the client interface and implementation change independently.</a:t>
+            </a:r>
+          </a:p>
+          <a:p>
+            <a:r>
+              <a:rPr lang="en-US" dirty="0"/>
+              <a:t>Hides the implementation details from the client – it does not know which implementation it is using.</a:t>
+            </a:r>
+          </a:p>
+          <a:p>
+            <a:r>
+              <a:rPr lang="en-US" dirty="0"/>
+              <a:t>Often used to design systems that require the </a:t>
+            </a:r>
+            <a:r>
+              <a:rPr lang="en-US" dirty="0" err="1"/>
+              <a:t>felxibility</a:t>
+            </a:r>
+            <a:r>
+              <a:rPr lang="en-US" dirty="0"/>
+              <a:t> to change the client interface or implementation dynamically.</a:t>
+            </a:r>
+          </a:p>
+        </p:txBody>
+      </p:sp>
+    </p:spTree>
+    <p:extLst>
+      <p:ext uri="{BB962C8B-B14F-4D97-AF65-F5344CB8AC3E}">
+        <p14:creationId xmlns:p14="http://schemas.microsoft.com/office/powerpoint/2010/main" val="1688989761"/>
+      </p:ext>
+    </p:extLst>
+  </p:cSld>
+  <p:clrMapOvr>
+    <a:masterClrMapping/>
+  </p:clrMapOvr>
+</p:sld>
+</file>
+
+<file path=ppt/slides/slide13.xml><?xml version="1.0" encoding="utf-8"?>
+<p:sld xmlns:a="http://schemas.openxmlformats.org/drawingml/2006/main" xmlns:r="http://schemas.openxmlformats.org/officeDocument/2006/relationships" xmlns:p="http://schemas.openxmlformats.org/presentationml/2006/main">
+  <p:cSld>
+    <p:spTree>
+      <p:nvGrpSpPr>
+        <p:cNvPr id="1" name=""/>
+        <p:cNvGrpSpPr/>
+        <p:nvPr/>
+      </p:nvGrpSpPr>
+      <p:grpSpPr>
+        <a:xfrm>
+          <a:off x="0" y="0"/>
+          <a:ext cx="0" cy="0"/>
+          <a:chOff x="0" y="0"/>
+          <a:chExt cx="0" cy="0"/>
+        </a:xfrm>
+      </p:grpSpPr>
+      <p:sp>
+        <p:nvSpPr>
+          <p:cNvPr id="2" name="Title 1">
+            <a:extLst>
+              <a:ext uri="{FF2B5EF4-FFF2-40B4-BE49-F238E27FC236}">
+                <a16:creationId xmlns:a16="http://schemas.microsoft.com/office/drawing/2014/main" id="{9BAB2FBF-8FF8-4315-8E24-2992DD76469B}"/>
+              </a:ext>
+            </a:extLst>
+          </p:cNvPr>
+          <p:cNvSpPr>
+            <a:spLocks noGrp="1"/>
+          </p:cNvSpPr>
+          <p:nvPr>
+            <p:ph type="title"/>
+          </p:nvPr>
+        </p:nvSpPr>
+        <p:spPr/>
+        <p:txBody>
+          <a:bodyPr/>
+          <a:lstStyle/>
+          <a:p>
+            <a:r>
+              <a:rPr lang="en-US" dirty="0"/>
+              <a:t>Other Design Problems</a:t>
+            </a:r>
+          </a:p>
+        </p:txBody>
+      </p:sp>
+    </p:spTree>
+    <p:extLst>
+      <p:ext uri="{BB962C8B-B14F-4D97-AF65-F5344CB8AC3E}">
+        <p14:creationId xmlns:p14="http://schemas.microsoft.com/office/powerpoint/2010/main" val="1697170835"/>
+      </p:ext>
+    </p:extLst>
+  </p:cSld>
+  <p:clrMapOvr>
+    <a:masterClrMapping/>
+  </p:clrMapOvr>
+</p:sld>
+</file>
+
 <file path=ppt/slides/slide2.xml><?xml version="1.0" encoding="utf-8"?>
 <p:sld xmlns:a="http://schemas.openxmlformats.org/drawingml/2006/main" xmlns:r="http://schemas.openxmlformats.org/officeDocument/2006/relationships" xmlns:p="http://schemas.openxmlformats.org/presentationml/2006/main">
   <p:cSld>
@@ -3711,6 +4695,511 @@
     <p:extLst>
       <p:ext uri="{BB962C8B-B14F-4D97-AF65-F5344CB8AC3E}">
         <p14:creationId xmlns:p14="http://schemas.microsoft.com/office/powerpoint/2010/main" val="2406570460"/>
+      </p:ext>
+    </p:extLst>
+  </p:cSld>
+  <p:clrMapOvr>
+    <a:masterClrMapping/>
+  </p:clrMapOvr>
+</p:sld>
+</file>
+
+<file path=ppt/slides/slide8.xml><?xml version="1.0" encoding="utf-8"?>
+<p:sld xmlns:a="http://schemas.openxmlformats.org/drawingml/2006/main" xmlns:r="http://schemas.openxmlformats.org/officeDocument/2006/relationships" xmlns:p="http://schemas.openxmlformats.org/presentationml/2006/main">
+  <p:cSld>
+    <p:spTree>
+      <p:nvGrpSpPr>
+        <p:cNvPr id="1" name=""/>
+        <p:cNvGrpSpPr/>
+        <p:nvPr/>
+      </p:nvGrpSpPr>
+      <p:grpSpPr>
+        <a:xfrm>
+          <a:off x="0" y="0"/>
+          <a:ext cx="0" cy="0"/>
+          <a:chOff x="0" y="0"/>
+          <a:chExt cx="0" cy="0"/>
+        </a:xfrm>
+      </p:grpSpPr>
+      <p:sp>
+        <p:nvSpPr>
+          <p:cNvPr id="2" name="Title 1">
+            <a:extLst>
+              <a:ext uri="{FF2B5EF4-FFF2-40B4-BE49-F238E27FC236}">
+                <a16:creationId xmlns:a16="http://schemas.microsoft.com/office/drawing/2014/main" id="{A0BBAEBF-10A7-4B3E-94D7-A862071210DE}"/>
+              </a:ext>
+            </a:extLst>
+          </p:cNvPr>
+          <p:cNvSpPr>
+            <a:spLocks noGrp="1"/>
+          </p:cNvSpPr>
+          <p:nvPr>
+            <p:ph type="title"/>
+          </p:nvPr>
+        </p:nvSpPr>
+        <p:spPr/>
+        <p:txBody>
+          <a:bodyPr/>
+          <a:lstStyle/>
+          <a:p>
+            <a:r>
+              <a:rPr lang="en-US" dirty="0"/>
+              <a:t>Applying Bridge Pattern</a:t>
+            </a:r>
+          </a:p>
+        </p:txBody>
+      </p:sp>
+    </p:spTree>
+    <p:extLst>
+      <p:ext uri="{BB962C8B-B14F-4D97-AF65-F5344CB8AC3E}">
+        <p14:creationId xmlns:p14="http://schemas.microsoft.com/office/powerpoint/2010/main" val="3517496140"/>
+      </p:ext>
+    </p:extLst>
+  </p:cSld>
+  <p:clrMapOvr>
+    <a:masterClrMapping/>
+  </p:clrMapOvr>
+</p:sld>
+</file>
+
+<file path=ppt/slides/slide9.xml><?xml version="1.0" encoding="utf-8"?>
+<p:sld xmlns:a="http://schemas.openxmlformats.org/drawingml/2006/main" xmlns:r="http://schemas.openxmlformats.org/officeDocument/2006/relationships" xmlns:p="http://schemas.openxmlformats.org/presentationml/2006/main">
+  <p:cSld>
+    <p:spTree>
+      <p:nvGrpSpPr>
+        <p:cNvPr id="1" name=""/>
+        <p:cNvGrpSpPr/>
+        <p:nvPr/>
+      </p:nvGrpSpPr>
+      <p:grpSpPr>
+        <a:xfrm>
+          <a:off x="0" y="0"/>
+          <a:ext cx="0" cy="0"/>
+          <a:chOff x="0" y="0"/>
+          <a:chExt cx="0" cy="0"/>
+        </a:xfrm>
+      </p:grpSpPr>
+      <p:sp>
+        <p:nvSpPr>
+          <p:cNvPr id="2" name="Title 1">
+            <a:extLst>
+              <a:ext uri="{FF2B5EF4-FFF2-40B4-BE49-F238E27FC236}">
+                <a16:creationId xmlns:a16="http://schemas.microsoft.com/office/drawing/2014/main" id="{46B171B9-32C7-40ED-A5D0-B690BF5A8D03}"/>
+              </a:ext>
+            </a:extLst>
+          </p:cNvPr>
+          <p:cNvSpPr>
+            <a:spLocks noGrp="1"/>
+          </p:cNvSpPr>
+          <p:nvPr>
+            <p:ph type="title"/>
+          </p:nvPr>
+        </p:nvSpPr>
+        <p:spPr/>
+        <p:txBody>
+          <a:bodyPr/>
+          <a:lstStyle/>
+          <a:p>
+            <a:r>
+              <a:rPr lang="en-US" dirty="0"/>
+              <a:t>Bridge Pattern Sample Code</a:t>
+            </a:r>
+          </a:p>
+        </p:txBody>
+      </p:sp>
+      <p:sp>
+        <p:nvSpPr>
+          <p:cNvPr id="4" name="Content Placeholder 3">
+            <a:extLst>
+              <a:ext uri="{FF2B5EF4-FFF2-40B4-BE49-F238E27FC236}">
+                <a16:creationId xmlns:a16="http://schemas.microsoft.com/office/drawing/2014/main" id="{4760B566-671D-4AC1-9BB9-E0DCC792CF38}"/>
+              </a:ext>
+            </a:extLst>
+          </p:cNvPr>
+          <p:cNvSpPr>
+            <a:spLocks noGrp="1"/>
+          </p:cNvSpPr>
+          <p:nvPr>
+            <p:ph sz="half" idx="1"/>
+          </p:nvPr>
+        </p:nvSpPr>
+        <p:spPr/>
+        <p:txBody>
+          <a:bodyPr>
+            <a:normAutofit/>
+          </a:bodyPr>
+          <a:lstStyle/>
+          <a:p>
+            <a:pPr marL="230188" indent="-230188">
+              <a:spcBef>
+                <a:spcPts val="20"/>
+              </a:spcBef>
+              <a:buNone/>
+            </a:pPr>
+            <a:r>
+              <a:rPr lang="en-US" sz="1800" dirty="0"/>
+              <a:t>Interface </a:t>
+            </a:r>
+            <a:r>
+              <a:rPr lang="en-US" sz="1800" dirty="0" err="1"/>
+              <a:t>DBAccessImpl</a:t>
+            </a:r>
+            <a:r>
+              <a:rPr lang="en-US" sz="1800" dirty="0"/>
+              <a:t> {</a:t>
+            </a:r>
+          </a:p>
+          <a:p>
+            <a:pPr marL="684213" indent="-222250">
+              <a:spcBef>
+                <a:spcPts val="20"/>
+              </a:spcBef>
+              <a:buNone/>
+            </a:pPr>
+            <a:r>
+              <a:rPr lang="en-US" sz="1800" dirty="0"/>
+              <a:t>public User </a:t>
+            </a:r>
+            <a:r>
+              <a:rPr lang="en-US" sz="1800" dirty="0" err="1"/>
+              <a:t>getUser</a:t>
+            </a:r>
+            <a:r>
+              <a:rPr lang="en-US" sz="1800" dirty="0"/>
+              <a:t>(String </a:t>
+            </a:r>
+            <a:r>
+              <a:rPr lang="en-US" sz="1800" dirty="0" err="1"/>
+              <a:t>uid</a:t>
+            </a:r>
+            <a:r>
+              <a:rPr lang="en-US" sz="1800" dirty="0"/>
+              <a:t>);</a:t>
+            </a:r>
+          </a:p>
+          <a:p>
+            <a:pPr marL="684213" indent="-222250">
+              <a:spcBef>
+                <a:spcPts val="20"/>
+              </a:spcBef>
+              <a:buNone/>
+            </a:pPr>
+            <a:r>
+              <a:rPr lang="en-US" sz="1800" dirty="0"/>
+              <a:t>public Book </a:t>
+            </a:r>
+            <a:r>
+              <a:rPr lang="en-US" sz="1800" dirty="0" err="1"/>
+              <a:t>getBook</a:t>
+            </a:r>
+            <a:r>
+              <a:rPr lang="en-US" sz="1800" dirty="0"/>
+              <a:t>(String </a:t>
+            </a:r>
+            <a:r>
+              <a:rPr lang="en-US" sz="1800" dirty="0" err="1"/>
+              <a:t>callNo</a:t>
+            </a:r>
+            <a:r>
+              <a:rPr lang="en-US" sz="1800" dirty="0"/>
+              <a:t>);</a:t>
+            </a:r>
+          </a:p>
+          <a:p>
+            <a:pPr marL="684213" indent="-222250">
+              <a:spcBef>
+                <a:spcPts val="20"/>
+              </a:spcBef>
+              <a:buNone/>
+            </a:pPr>
+            <a:r>
+              <a:rPr lang="en-US" sz="1800" dirty="0"/>
+              <a:t>public void </a:t>
+            </a:r>
+            <a:r>
+              <a:rPr lang="en-US" sz="1800" dirty="0" err="1"/>
+              <a:t>saveLoan</a:t>
+            </a:r>
+            <a:r>
+              <a:rPr lang="en-US" sz="1800" dirty="0"/>
+              <a:t>(Loan loan);</a:t>
+            </a:r>
+          </a:p>
+          <a:p>
+            <a:pPr marL="684213" indent="-222250">
+              <a:spcBef>
+                <a:spcPts val="20"/>
+              </a:spcBef>
+              <a:buNone/>
+            </a:pPr>
+            <a:r>
+              <a:rPr lang="en-US" sz="1800" dirty="0"/>
+              <a:t>public void </a:t>
+            </a:r>
+            <a:r>
+              <a:rPr lang="en-US" sz="1800" dirty="0" err="1"/>
+              <a:t>saveBook</a:t>
+            </a:r>
+            <a:r>
+              <a:rPr lang="en-US" sz="1800" dirty="0"/>
+              <a:t>(Book book);</a:t>
+            </a:r>
+          </a:p>
+          <a:p>
+            <a:pPr marL="0" indent="0">
+              <a:spcBef>
+                <a:spcPts val="20"/>
+              </a:spcBef>
+              <a:buNone/>
+            </a:pPr>
+            <a:r>
+              <a:rPr lang="en-US" sz="1800" dirty="0"/>
+              <a:t>}</a:t>
+            </a:r>
+          </a:p>
+          <a:p>
+            <a:pPr marL="230188" indent="-230188">
+              <a:spcBef>
+                <a:spcPts val="20"/>
+              </a:spcBef>
+              <a:buNone/>
+            </a:pPr>
+            <a:r>
+              <a:rPr lang="en-US" sz="1800" dirty="0"/>
+              <a:t>This is equivalent to pure virtual methods in C++.</a:t>
+            </a:r>
+          </a:p>
+        </p:txBody>
+      </p:sp>
+      <p:sp>
+        <p:nvSpPr>
+          <p:cNvPr id="5" name="Content Placeholder 4">
+            <a:extLst>
+              <a:ext uri="{FF2B5EF4-FFF2-40B4-BE49-F238E27FC236}">
+                <a16:creationId xmlns:a16="http://schemas.microsoft.com/office/drawing/2014/main" id="{7816716C-C699-4E95-ACFD-7FBFFEDF1080}"/>
+              </a:ext>
+            </a:extLst>
+          </p:cNvPr>
+          <p:cNvSpPr>
+            <a:spLocks noGrp="1"/>
+          </p:cNvSpPr>
+          <p:nvPr>
+            <p:ph sz="half" idx="2"/>
+          </p:nvPr>
+        </p:nvSpPr>
+        <p:spPr/>
+        <p:txBody>
+          <a:bodyPr>
+            <a:normAutofit/>
+          </a:bodyPr>
+          <a:lstStyle/>
+          <a:p>
+            <a:pPr marL="230188" indent="-230188">
+              <a:spcBef>
+                <a:spcPts val="20"/>
+              </a:spcBef>
+              <a:buNone/>
+            </a:pPr>
+            <a:r>
+              <a:rPr lang="en-US" sz="1800" dirty="0"/>
+              <a:t>public class </a:t>
+            </a:r>
+            <a:r>
+              <a:rPr lang="en-US" sz="1800" dirty="0" err="1"/>
+              <a:t>LDAPAccess</a:t>
+            </a:r>
+            <a:r>
+              <a:rPr lang="en-US" sz="1800" dirty="0"/>
+              <a:t> implements </a:t>
+            </a:r>
+            <a:r>
+              <a:rPr lang="en-US" sz="1800" dirty="0" err="1"/>
+              <a:t>DBAccessImpl</a:t>
+            </a:r>
+            <a:endParaRPr lang="en-US" sz="1800" dirty="0"/>
+          </a:p>
+          <a:p>
+            <a:pPr marL="0" indent="0">
+              <a:spcBef>
+                <a:spcPts val="20"/>
+              </a:spcBef>
+              <a:buNone/>
+            </a:pPr>
+            <a:r>
+              <a:rPr lang="en-US" sz="1800" dirty="0"/>
+              <a:t>{</a:t>
+            </a:r>
+          </a:p>
+          <a:p>
+            <a:pPr marL="684213" indent="-222250">
+              <a:spcBef>
+                <a:spcPts val="20"/>
+              </a:spcBef>
+              <a:buNone/>
+            </a:pPr>
+            <a:r>
+              <a:rPr lang="en-US" sz="1800" dirty="0"/>
+              <a:t>public User </a:t>
+            </a:r>
+            <a:r>
+              <a:rPr lang="en-US" sz="1800" dirty="0" err="1"/>
+              <a:t>getUser</a:t>
+            </a:r>
+            <a:r>
+              <a:rPr lang="en-US" sz="1800" dirty="0"/>
+              <a:t>(String </a:t>
+            </a:r>
+            <a:r>
+              <a:rPr lang="en-US" sz="1800" dirty="0" err="1"/>
+              <a:t>uid</a:t>
+            </a:r>
+            <a:r>
+              <a:rPr lang="en-US" sz="1800" dirty="0"/>
+              <a:t>)</a:t>
+            </a:r>
+          </a:p>
+          <a:p>
+            <a:pPr marL="684213" indent="-222250">
+              <a:spcBef>
+                <a:spcPts val="20"/>
+              </a:spcBef>
+              <a:buNone/>
+            </a:pPr>
+            <a:r>
+              <a:rPr lang="en-US" sz="1800" dirty="0"/>
+              <a:t>{  /** get a User object from the LDAP DB*/ }</a:t>
+            </a:r>
+          </a:p>
+          <a:p>
+            <a:pPr marL="684213" indent="-222250">
+              <a:spcBef>
+                <a:spcPts val="20"/>
+              </a:spcBef>
+              <a:buNone/>
+            </a:pPr>
+            <a:r>
+              <a:rPr lang="en-US" sz="1800" dirty="0"/>
+              <a:t>public Book </a:t>
+            </a:r>
+            <a:r>
+              <a:rPr lang="en-US" sz="1800" dirty="0" err="1"/>
+              <a:t>getBook</a:t>
+            </a:r>
+            <a:r>
+              <a:rPr lang="en-US" sz="1800" dirty="0"/>
+              <a:t> (</a:t>
+            </a:r>
+            <a:r>
+              <a:rPr lang="en-US" sz="1800" dirty="0" err="1"/>
+              <a:t>Stgring</a:t>
+            </a:r>
+            <a:r>
+              <a:rPr lang="en-US" sz="1800" dirty="0"/>
+              <a:t> </a:t>
+            </a:r>
+            <a:r>
+              <a:rPr lang="en-US" sz="1800" dirty="0" err="1"/>
+              <a:t>callNo</a:t>
+            </a:r>
+            <a:r>
+              <a:rPr lang="en-US" sz="1800" dirty="0"/>
+              <a:t>)</a:t>
+            </a:r>
+          </a:p>
+          <a:p>
+            <a:pPr marL="684213" indent="-222250">
+              <a:spcBef>
+                <a:spcPts val="20"/>
+              </a:spcBef>
+              <a:buNone/>
+            </a:pPr>
+            <a:r>
+              <a:rPr lang="en-US" sz="1800" dirty="0"/>
+              <a:t>{ /** get a Book object from the LDAP DB */}</a:t>
+            </a:r>
+          </a:p>
+          <a:p>
+            <a:pPr marL="684213" indent="-222250">
+              <a:spcBef>
+                <a:spcPts val="20"/>
+              </a:spcBef>
+              <a:buNone/>
+            </a:pPr>
+            <a:r>
+              <a:rPr lang="en-US" sz="1800" dirty="0"/>
+              <a:t>public void </a:t>
+            </a:r>
+            <a:r>
+              <a:rPr lang="en-US" sz="1800" dirty="0" err="1"/>
+              <a:t>saveLoan</a:t>
+            </a:r>
+            <a:r>
+              <a:rPr lang="en-US" sz="1800" dirty="0"/>
+              <a:t>(Loan loan)</a:t>
+            </a:r>
+          </a:p>
+          <a:p>
+            <a:pPr marL="684213" indent="-222250">
+              <a:spcBef>
+                <a:spcPts val="20"/>
+              </a:spcBef>
+              <a:buNone/>
+            </a:pPr>
+            <a:r>
+              <a:rPr lang="en-US" sz="1800" dirty="0"/>
+              <a:t>{ /** save a Loan object to the LDAP DB */ }</a:t>
+            </a:r>
+          </a:p>
+          <a:p>
+            <a:pPr marL="684213" indent="-222250">
+              <a:spcBef>
+                <a:spcPts val="20"/>
+              </a:spcBef>
+              <a:buNone/>
+            </a:pPr>
+            <a:r>
+              <a:rPr lang="en-US" sz="1800" dirty="0"/>
+              <a:t>public void </a:t>
+            </a:r>
+            <a:r>
+              <a:rPr lang="en-US" sz="1800" dirty="0" err="1"/>
+              <a:t>saveBook</a:t>
+            </a:r>
+            <a:r>
+              <a:rPr lang="en-US" sz="1800" dirty="0"/>
+              <a:t>(Book book)</a:t>
+            </a:r>
+          </a:p>
+          <a:p>
+            <a:pPr marL="684213" indent="-222250">
+              <a:spcBef>
+                <a:spcPts val="20"/>
+              </a:spcBef>
+              <a:buNone/>
+            </a:pPr>
+            <a:r>
+              <a:rPr lang="en-US" sz="1800" dirty="0"/>
+              <a:t>{ /** save a Book object to the LDAP DB */ }</a:t>
+            </a:r>
+          </a:p>
+          <a:p>
+            <a:pPr marL="230188" indent="-230188">
+              <a:spcBef>
+                <a:spcPts val="20"/>
+              </a:spcBef>
+              <a:buNone/>
+            </a:pPr>
+            <a:r>
+              <a:rPr lang="en-US" sz="1800" dirty="0"/>
+              <a:t>}</a:t>
+            </a:r>
+          </a:p>
+        </p:txBody>
+      </p:sp>
+    </p:spTree>
+    <p:extLst>
+      <p:ext uri="{BB962C8B-B14F-4D97-AF65-F5344CB8AC3E}">
+        <p14:creationId xmlns:p14="http://schemas.microsoft.com/office/powerpoint/2010/main" val="3194048121"/>
       </p:ext>
     </p:extLst>
   </p:cSld>

</xml_diff>